<commit_message>
Added images with 2 lines and 3 lines
</commit_message>
<xml_diff>
--- a/recursive-ransac/src/recursive_ransac.pptx
+++ b/recursive-ransac/src/recursive_ransac.pptx
@@ -12,6 +12,8 @@
     <p:sldId id="260" r:id="rId6"/>
     <p:sldId id="261" r:id="rId7"/>
     <p:sldId id="262" r:id="rId8"/>
+    <p:sldId id="263" r:id="rId9"/>
+    <p:sldId id="264" r:id="rId10"/>
   </p:sldIdLst>
   <p:sldSz cx="12192000" cy="6858000"/>
   <p:notesSz cx="6858000" cy="9144000"/>
@@ -110,6 +112,11 @@
       </a:defRPr>
     </a:lvl9pPr>
   </p:defaultTextStyle>
+  <p:extLst>
+    <p:ext uri="{EFAFB233-063F-42B5-8137-9DF3F51BA10A}">
+      <p15:sldGuideLst xmlns:p15="http://schemas.microsoft.com/office/powerpoint/2012/main"/>
+    </p:ext>
+  </p:extLst>
 </p:presentation>
 </file>
 
@@ -8190,6 +8197,296 @@
 </p:sld>
 </file>
 
+<file path=ppt/slides/slide8.xml><?xml version="1.0" encoding="utf-8"?>
+<p:sld xmlns:a="http://schemas.openxmlformats.org/drawingml/2006/main" xmlns:r="http://schemas.openxmlformats.org/officeDocument/2006/relationships" xmlns:p="http://schemas.openxmlformats.org/presentationml/2006/main">
+  <p:cSld>
+    <p:spTree>
+      <p:nvGrpSpPr>
+        <p:cNvPr id="1" name=""/>
+        <p:cNvGrpSpPr/>
+        <p:nvPr/>
+      </p:nvGrpSpPr>
+      <p:grpSpPr>
+        <a:xfrm>
+          <a:off x="0" y="0"/>
+          <a:ext cx="0" cy="0"/>
+          <a:chOff x="0" y="0"/>
+          <a:chExt cx="0" cy="0"/>
+        </a:xfrm>
+      </p:grpSpPr>
+      <p:pic>
+        <p:nvPicPr>
+          <p:cNvPr id="3" name="Picture 2">
+            <a:extLst>
+              <a:ext uri="{FF2B5EF4-FFF2-40B4-BE49-F238E27FC236}">
+                <a16:creationId xmlns:a16="http://schemas.microsoft.com/office/drawing/2014/main" id="{A12A3E3C-DCBE-4727-86CC-BBFC287E9C27}"/>
+              </a:ext>
+            </a:extLst>
+          </p:cNvPr>
+          <p:cNvPicPr>
+            <a:picLocks noChangeAspect="1"/>
+          </p:cNvPicPr>
+          <p:nvPr/>
+        </p:nvPicPr>
+        <p:blipFill>
+          <a:blip r:embed="rId2"/>
+          <a:stretch>
+            <a:fillRect/>
+          </a:stretch>
+        </p:blipFill>
+        <p:spPr>
+          <a:xfrm>
+            <a:off x="7741009" y="1990725"/>
+            <a:ext cx="3629025" cy="2876550"/>
+          </a:xfrm>
+          <a:prstGeom prst="rect">
+            <a:avLst/>
+          </a:prstGeom>
+          <a:ln>
+            <a:solidFill>
+              <a:schemeClr val="accent1"/>
+            </a:solidFill>
+          </a:ln>
+        </p:spPr>
+      </p:pic>
+      <p:pic>
+        <p:nvPicPr>
+          <p:cNvPr id="7" name="Picture 6">
+            <a:extLst>
+              <a:ext uri="{FF2B5EF4-FFF2-40B4-BE49-F238E27FC236}">
+                <a16:creationId xmlns:a16="http://schemas.microsoft.com/office/drawing/2014/main" id="{C0C5EF23-5B62-4817-B0EB-8BA926B39C4E}"/>
+              </a:ext>
+            </a:extLst>
+          </p:cNvPr>
+          <p:cNvPicPr>
+            <a:picLocks noChangeAspect="1"/>
+          </p:cNvPicPr>
+          <p:nvPr/>
+        </p:nvPicPr>
+        <p:blipFill>
+          <a:blip r:embed="rId3"/>
+          <a:stretch>
+            <a:fillRect/>
+          </a:stretch>
+        </p:blipFill>
+        <p:spPr>
+          <a:xfrm>
+            <a:off x="1598856" y="1995487"/>
+            <a:ext cx="3629025" cy="2867025"/>
+          </a:xfrm>
+          <a:prstGeom prst="rect">
+            <a:avLst/>
+          </a:prstGeom>
+          <a:noFill/>
+          <a:ln>
+            <a:solidFill>
+              <a:schemeClr val="accent1"/>
+            </a:solidFill>
+          </a:ln>
+        </p:spPr>
+      </p:pic>
+      <p:sp>
+        <p:nvSpPr>
+          <p:cNvPr id="8" name="Arrow: Right 7">
+            <a:extLst>
+              <a:ext uri="{FF2B5EF4-FFF2-40B4-BE49-F238E27FC236}">
+                <a16:creationId xmlns:a16="http://schemas.microsoft.com/office/drawing/2014/main" id="{12365B2E-A4D1-432C-BF2F-5100C9691EFF}"/>
+              </a:ext>
+            </a:extLst>
+          </p:cNvPr>
+          <p:cNvSpPr/>
+          <p:nvPr/>
+        </p:nvSpPr>
+        <p:spPr>
+          <a:xfrm>
+            <a:off x="5838825" y="3181350"/>
+            <a:ext cx="1285875" cy="704850"/>
+          </a:xfrm>
+          <a:prstGeom prst="rightArrow">
+            <a:avLst/>
+          </a:prstGeom>
+          <a:noFill/>
+        </p:spPr>
+        <p:style>
+          <a:lnRef idx="2">
+            <a:schemeClr val="accent1">
+              <a:shade val="50000"/>
+            </a:schemeClr>
+          </a:lnRef>
+          <a:fillRef idx="1">
+            <a:schemeClr val="accent1"/>
+          </a:fillRef>
+          <a:effectRef idx="0">
+            <a:schemeClr val="accent1"/>
+          </a:effectRef>
+          <a:fontRef idx="minor">
+            <a:schemeClr val="lt1"/>
+          </a:fontRef>
+        </p:style>
+        <p:txBody>
+          <a:bodyPr rtlCol="0" anchor="ctr"/>
+          <a:lstStyle/>
+          <a:p>
+            <a:pPr algn="ctr"/>
+            <a:endParaRPr lang="en-GB"/>
+          </a:p>
+        </p:txBody>
+      </p:sp>
+    </p:spTree>
+    <p:extLst>
+      <p:ext uri="{BB962C8B-B14F-4D97-AF65-F5344CB8AC3E}">
+        <p14:creationId xmlns:p14="http://schemas.microsoft.com/office/powerpoint/2010/main" val="28470026"/>
+      </p:ext>
+    </p:extLst>
+  </p:cSld>
+  <p:clrMapOvr>
+    <a:masterClrMapping/>
+  </p:clrMapOvr>
+</p:sld>
+</file>
+
+<file path=ppt/slides/slide9.xml><?xml version="1.0" encoding="utf-8"?>
+<p:sld xmlns:a="http://schemas.openxmlformats.org/drawingml/2006/main" xmlns:r="http://schemas.openxmlformats.org/officeDocument/2006/relationships" xmlns:p="http://schemas.openxmlformats.org/presentationml/2006/main">
+  <p:cSld>
+    <p:spTree>
+      <p:nvGrpSpPr>
+        <p:cNvPr id="1" name=""/>
+        <p:cNvGrpSpPr/>
+        <p:nvPr/>
+      </p:nvGrpSpPr>
+      <p:grpSpPr>
+        <a:xfrm>
+          <a:off x="0" y="0"/>
+          <a:ext cx="0" cy="0"/>
+          <a:chOff x="0" y="0"/>
+          <a:chExt cx="0" cy="0"/>
+        </a:xfrm>
+      </p:grpSpPr>
+      <p:pic>
+        <p:nvPicPr>
+          <p:cNvPr id="3" name="Picture 2">
+            <a:extLst>
+              <a:ext uri="{FF2B5EF4-FFF2-40B4-BE49-F238E27FC236}">
+                <a16:creationId xmlns:a16="http://schemas.microsoft.com/office/drawing/2014/main" id="{28D62ABA-7FFF-4452-A672-E7E42FD85F5B}"/>
+              </a:ext>
+            </a:extLst>
+          </p:cNvPr>
+          <p:cNvPicPr>
+            <a:picLocks noChangeAspect="1"/>
+          </p:cNvPicPr>
+          <p:nvPr/>
+        </p:nvPicPr>
+        <p:blipFill>
+          <a:blip r:embed="rId2"/>
+          <a:stretch>
+            <a:fillRect/>
+          </a:stretch>
+        </p:blipFill>
+        <p:spPr>
+          <a:xfrm>
+            <a:off x="7562850" y="1990725"/>
+            <a:ext cx="3657600" cy="2876550"/>
+          </a:xfrm>
+          <a:prstGeom prst="rect">
+            <a:avLst/>
+          </a:prstGeom>
+        </p:spPr>
+      </p:pic>
+      <p:pic>
+        <p:nvPicPr>
+          <p:cNvPr id="5" name="Picture 4">
+            <a:extLst>
+              <a:ext uri="{FF2B5EF4-FFF2-40B4-BE49-F238E27FC236}">
+                <a16:creationId xmlns:a16="http://schemas.microsoft.com/office/drawing/2014/main" id="{7AF7BD83-B49D-49B9-BE54-9F0775A1E1DE}"/>
+              </a:ext>
+            </a:extLst>
+          </p:cNvPr>
+          <p:cNvPicPr>
+            <a:picLocks noChangeAspect="1"/>
+          </p:cNvPicPr>
+          <p:nvPr/>
+        </p:nvPicPr>
+        <p:blipFill>
+          <a:blip r:embed="rId3"/>
+          <a:stretch>
+            <a:fillRect/>
+          </a:stretch>
+        </p:blipFill>
+        <p:spPr>
+          <a:xfrm>
+            <a:off x="1733550" y="1971675"/>
+            <a:ext cx="3638550" cy="2914650"/>
+          </a:xfrm>
+          <a:prstGeom prst="rect">
+            <a:avLst/>
+          </a:prstGeom>
+          <a:ln>
+            <a:solidFill>
+              <a:schemeClr val="accent1"/>
+            </a:solidFill>
+          </a:ln>
+        </p:spPr>
+      </p:pic>
+      <p:sp>
+        <p:nvSpPr>
+          <p:cNvPr id="6" name="Arrow: Right 5">
+            <a:extLst>
+              <a:ext uri="{FF2B5EF4-FFF2-40B4-BE49-F238E27FC236}">
+                <a16:creationId xmlns:a16="http://schemas.microsoft.com/office/drawing/2014/main" id="{F7AA465E-A8E9-44B4-A208-DD67671A61AB}"/>
+              </a:ext>
+            </a:extLst>
+          </p:cNvPr>
+          <p:cNvSpPr/>
+          <p:nvPr/>
+        </p:nvSpPr>
+        <p:spPr>
+          <a:xfrm>
+            <a:off x="5838825" y="3181350"/>
+            <a:ext cx="1285875" cy="704850"/>
+          </a:xfrm>
+          <a:prstGeom prst="rightArrow">
+            <a:avLst/>
+          </a:prstGeom>
+          <a:noFill/>
+        </p:spPr>
+        <p:style>
+          <a:lnRef idx="2">
+            <a:schemeClr val="accent1">
+              <a:shade val="50000"/>
+            </a:schemeClr>
+          </a:lnRef>
+          <a:fillRef idx="1">
+            <a:schemeClr val="accent1"/>
+          </a:fillRef>
+          <a:effectRef idx="0">
+            <a:schemeClr val="accent1"/>
+          </a:effectRef>
+          <a:fontRef idx="minor">
+            <a:schemeClr val="lt1"/>
+          </a:fontRef>
+        </p:style>
+        <p:txBody>
+          <a:bodyPr rtlCol="0" anchor="ctr"/>
+          <a:lstStyle/>
+          <a:p>
+            <a:pPr algn="ctr"/>
+            <a:endParaRPr lang="en-GB"/>
+          </a:p>
+        </p:txBody>
+      </p:sp>
+    </p:spTree>
+    <p:extLst>
+      <p:ext uri="{BB962C8B-B14F-4D97-AF65-F5344CB8AC3E}">
+        <p14:creationId xmlns:p14="http://schemas.microsoft.com/office/powerpoint/2010/main" val="3174034206"/>
+      </p:ext>
+    </p:extLst>
+  </p:cSld>
+  <p:clrMapOvr>
+    <a:masterClrMapping/>
+  </p:clrMapOvr>
+</p:sld>
+</file>
+
 <file path=ppt/theme/theme1.xml><?xml version="1.0" encoding="utf-8"?>
 <a:theme xmlns:a="http://schemas.openxmlformats.org/drawingml/2006/main" name="Office Theme">
   <a:themeElements>

</xml_diff>